<commit_message>
Mess you trap up typa commit
</commit_message>
<xml_diff>
--- a/Dash-Streamlit_Presentation.pptx
+++ b/Dash-Streamlit_Presentation.pptx
@@ -7022,7 +7022,11 @@
           <a:lstStyle/>
           <a:p>
             <a:pPr algn="l"/>
-            <a:endParaRPr lang="en-GB"/>
+            <a:r>
+              <a:rPr lang="pl-PL" dirty="0"/>
+              <a:t>Data Dashboard</a:t>
+            </a:r>
+            <a:endParaRPr lang="en-GB" dirty="0"/>
           </a:p>
         </p:txBody>
       </p:sp>
@@ -9171,7 +9175,7 @@
           <a:lstStyle/>
           <a:p>
             <a:r>
-              <a:rPr lang="pl-PL"/>
+              <a:rPr lang="pl-PL" dirty="0" err="1"/>
               <a:t>What</a:t>
             </a:r>
             <a:r>
@@ -9179,7 +9183,7 @@
               <a:t> </a:t>
             </a:r>
             <a:r>
-              <a:rPr lang="pl-PL"/>
+              <a:rPr lang="pl-PL" dirty="0" err="1"/>
               <a:t>is</a:t>
             </a:r>
             <a:r>
@@ -9187,7 +9191,7 @@
               <a:t> </a:t>
             </a:r>
             <a:r>
-              <a:rPr lang="pl-PL"/>
+              <a:rPr lang="pl-PL" dirty="0" err="1"/>
               <a:t>Streamlit</a:t>
             </a:r>
             <a:r>

</xml_diff>